<commit_message>
fix #1: suport table cell
</commit_message>
<xml_diff>
--- a/example/presentation_generated.pptx
+++ b/example/presentation_generated.pptx
@@ -5,15 +5,16 @@
     <p:sldMasterId id="2147483648" r:id="rId1"/>
   </p:sldMasterIdLst>
   <p:notesMasterIdLst>
-    <p:notesMasterId r:id="rId6"/>
+    <p:notesMasterId r:id="rId7"/>
   </p:notesMasterIdLst>
   <p:handoutMasterIdLst>
-    <p:handoutMasterId r:id="rId7"/>
+    <p:handoutMasterId r:id="rId8"/>
   </p:handoutMasterIdLst>
   <p:sldIdLst>
     <p:sldId id="256" r:id="rId3"/>
     <p:sldId id="257" r:id="rId4"/>
     <p:sldId id="258" r:id="rId5"/>
+    <p:sldId id="259" r:id="rId6"/>
   </p:sldIdLst>
   <p:sldSz cx="12192000" cy="6858000"/>
   <p:notesSz cx="7103745" cy="10234295"/>
@@ -3266,7 +3267,7 @@
         <a:spcBef>
           <a:spcPts val="1000"/>
         </a:spcBef>
-        <a:buFont typeface="Arial" panose="02080604020202020204" pitchFamily="34" charset="0"/>
+        <a:buFont typeface="Arial" panose="020B0604020202090204" pitchFamily="34" charset="0"/>
         <a:buChar char="•"/>
         <a:defRPr sz="2400" kern="1200">
           <a:solidFill>
@@ -3284,7 +3285,7 @@
         <a:spcBef>
           <a:spcPts val="500"/>
         </a:spcBef>
-        <a:buFont typeface="Arial" panose="02080604020202020204" pitchFamily="34" charset="0"/>
+        <a:buFont typeface="Arial" panose="020B0604020202090204" pitchFamily="34" charset="0"/>
         <a:buChar char="•"/>
         <a:defRPr sz="2000" kern="1200">
           <a:solidFill>
@@ -3302,7 +3303,7 @@
         <a:spcBef>
           <a:spcPts val="500"/>
         </a:spcBef>
-        <a:buFont typeface="Arial" panose="02080604020202020204" pitchFamily="34" charset="0"/>
+        <a:buFont typeface="Arial" panose="020B0604020202090204" pitchFamily="34" charset="0"/>
         <a:buChar char="•"/>
         <a:defRPr sz="1800" kern="1200">
           <a:solidFill>
@@ -3320,7 +3321,7 @@
         <a:spcBef>
           <a:spcPts val="500"/>
         </a:spcBef>
-        <a:buFont typeface="Arial" panose="02080604020202020204" pitchFamily="34" charset="0"/>
+        <a:buFont typeface="Arial" panose="020B0604020202090204" pitchFamily="34" charset="0"/>
         <a:buChar char="•"/>
         <a:defRPr sz="1800" kern="1200">
           <a:solidFill>
@@ -3338,7 +3339,7 @@
         <a:spcBef>
           <a:spcPts val="500"/>
         </a:spcBef>
-        <a:buFont typeface="Arial" panose="02080604020202020204" pitchFamily="34" charset="0"/>
+        <a:buFont typeface="Arial" panose="020B0604020202090204" pitchFamily="34" charset="0"/>
         <a:buChar char="•"/>
         <a:defRPr sz="1800" kern="1200">
           <a:solidFill>
@@ -3356,7 +3357,7 @@
         <a:spcBef>
           <a:spcPts val="500"/>
         </a:spcBef>
-        <a:buFont typeface="Arial" panose="02080604020202020204" pitchFamily="34" charset="0"/>
+        <a:buFont typeface="Arial" panose="020B0604020202090204" pitchFamily="34" charset="0"/>
         <a:buChar char="•"/>
         <a:defRPr sz="1800" kern="1200">
           <a:solidFill>
@@ -3374,7 +3375,7 @@
         <a:spcBef>
           <a:spcPts val="500"/>
         </a:spcBef>
-        <a:buFont typeface="Arial" panose="02080604020202020204" pitchFamily="34" charset="0"/>
+        <a:buFont typeface="Arial" panose="020B0604020202090204" pitchFamily="34" charset="0"/>
         <a:buChar char="•"/>
         <a:defRPr sz="1800" kern="1200">
           <a:solidFill>
@@ -3392,7 +3393,7 @@
         <a:spcBef>
           <a:spcPts val="500"/>
         </a:spcBef>
-        <a:buFont typeface="Arial" panose="02080604020202020204" pitchFamily="34" charset="0"/>
+        <a:buFont typeface="Arial" panose="020B0604020202090204" pitchFamily="34" charset="0"/>
         <a:buChar char="•"/>
         <a:defRPr sz="1800" kern="1200">
           <a:solidFill>
@@ -3410,7 +3411,7 @@
         <a:spcBef>
           <a:spcPts val="500"/>
         </a:spcBef>
-        <a:buFont typeface="Arial" panose="02080604020202020204" pitchFamily="34" charset="0"/>
+        <a:buFont typeface="Arial" panose="020B0604020202090204" pitchFamily="34" charset="0"/>
         <a:buChar char="•"/>
         <a:defRPr sz="1800" kern="1200">
           <a:solidFill>
@@ -3797,6 +3798,183 @@
     <a:masterClrMapping/>
   </p:clrMapOvr>
 </p:sld>
+</file>
+
+<file path=ppt/slides/slide4.xml><?xml version="1.0" encoding="utf-8"?>
+<p:sld xmlns:a="http://schemas.openxmlformats.org/drawingml/2006/main" xmlns:r="http://schemas.openxmlformats.org/officeDocument/2006/relationships" xmlns:p="http://schemas.openxmlformats.org/presentationml/2006/main">
+  <p:cSld>
+    <p:spTree>
+      <p:nvGrpSpPr>
+        <p:cNvPr id="1" name=""/>
+        <p:cNvGrpSpPr/>
+        <p:nvPr/>
+      </p:nvGrpSpPr>
+      <p:grpSpPr/>
+      <p:sp>
+        <p:nvSpPr>
+          <p:cNvPr id="2" name="Title 1"/>
+          <p:cNvSpPr>
+            <a:spLocks noGrp="1"/>
+          </p:cNvSpPr>
+          <p:nvPr>
+            <p:ph type="title"/>
+          </p:nvPr>
+        </p:nvSpPr>
+        <p:spPr/>
+        <p:txBody>
+          <a:bodyPr/>
+          <a:p>
+            <a:r>
+              <a:rPr lang="fr-FR" altLang="en-US"/>
+              <a:t>Table</a:t>
+            </a:r>
+            <a:endParaRPr lang="fr-FR" altLang="en-US"/>
+          </a:p>
+        </p:txBody>
+      </p:sp>
+      <p:graphicFrame>
+        <p:nvGraphicFramePr>
+          <p:cNvPr id="4" name="Content Placeholder 3"/>
+          <p:cNvGraphicFramePr/>
+          <p:nvPr>
+            <p:ph idx="1"/>
+            <p:custDataLst>
+              <p:tags r:id="rId1"/>
+            </p:custDataLst>
+          </p:nvPr>
+        </p:nvGraphicFramePr>
+        <p:xfrm>
+          <a:off x="647700" y="1825625"/>
+          <a:ext cx="10515600" cy="1143000"/>
+        </p:xfrm>
+        <a:graphic>
+          <a:graphicData uri="http://schemas.openxmlformats.org/drawingml/2006/table">
+            <a:tbl>
+              <a:tblPr firstRow="1" bandRow="1">
+                <a:tableStyleId>{5C22544A-7EE6-4342-B048-85BDC9FD1C3A}</a:tableStyleId>
+              </a:tblPr>
+              <a:tblGrid>
+                <a:gridCol w="5257800"/>
+                <a:gridCol w="5257800"/>
+              </a:tblGrid>
+              <a:tr h="381000">
+                <a:tc>
+                  <a:txBody>
+                    <a:bodyPr/>
+                    <a:p>
+                      <a:pPr>
+                        <a:buNone/>
+                      </a:pPr>
+                      <a:r>
+                        <a:rPr lang="fr-FR" altLang="en-US"/>
+                        <a:t>Name</a:t>
+                      </a:r>
+                      <a:endParaRPr lang="fr-FR" altLang="en-US"/>
+                    </a:p>
+                  </a:txBody>
+                  <a:tcPr/>
+                </a:tc>
+                <a:tc>
+                  <a:txBody>
+                    <a:bodyPr/>
+                    <a:p>
+                      <a:pPr>
+                        <a:buNone/>
+                      </a:pPr>
+                      <a:r>
+                        <a:rPr lang="fr-FR" altLang="en-US"/>
+                        <a:t>Size</a:t>
+                      </a:r>
+                      <a:endParaRPr lang="fr-FR" altLang="en-US"/>
+                    </a:p>
+                  </a:txBody>
+                  <a:tcPr/>
+                </a:tc>
+              </a:tr>
+              <a:tr h="381000">
+                <a:tc>
+                  <a:txBody>
+                    <a:bodyPr/>
+                    <a:p>
+                      <a:pPr>
+                        <a:buNone/>
+                      </a:pPr>
+                      <a:r>
+                        <a:rPr lang="en-US"/>
+                        <a:t>Leptotyphlops carlae</a:t>
+                      </a:r>
+                      <a:endParaRPr lang="en-US"/>
+                    </a:p>
+                  </a:txBody>
+                  <a:tcPr/>
+                </a:tc>
+                <a:tc>
+                  <a:txBody>
+                    <a:bodyPr/>
+                    <a:p>
+                      <a:pPr>
+                        <a:buNone/>
+                      </a:pPr>
+                      <a:r>
+                        <a:rPr lang="fr-FR" altLang="en-US"/>
+                        <a:t>10</a:t>
+                      </a:r>
+                      <a:endParaRPr lang="fr-FR" altLang="en-US"/>
+                    </a:p>
+                  </a:txBody>
+                  <a:tcPr/>
+                </a:tc>
+              </a:tr>
+              <a:tr h="381000">
+                <a:tc>
+                  <a:txBody>
+                    <a:bodyPr/>
+                    <a:p>
+                      <a:pPr>
+                        <a:buNone/>
+                      </a:pPr>
+                      <a:r>
+                        <a:rPr lang="en-US"/>
+                        <a:t>Reticulated Pythons</a:t>
+                      </a:r>
+                      <a:endParaRPr lang="en-US"/>
+                    </a:p>
+                  </a:txBody>
+                  <a:tcPr/>
+                </a:tc>
+                <a:tc>
+                  <a:txBody>
+                    <a:bodyPr/>
+                    <a:p>
+                      <a:pPr>
+                        <a:buNone/>
+                      </a:pPr>
+                      <a:r>
+                        <a:rPr lang="fr-FR" altLang="en-US"/>
+                        <a:t>9000</a:t>
+                      </a:r>
+                      <a:endParaRPr lang="fr-FR" altLang="en-US"/>
+                    </a:p>
+                  </a:txBody>
+                  <a:tcPr/>
+                </a:tc>
+              </a:tr>
+            </a:tbl>
+          </a:graphicData>
+        </a:graphic>
+      </p:graphicFrame>
+    </p:spTree>
+  </p:cSld>
+  <p:clrMapOvr>
+    <a:masterClrMapping/>
+  </p:clrMapOvr>
+</p:sld>
+</file>
+
+<file path=ppt/tags/tag1.xml><?xml version="1.0" encoding="utf-8"?>
+<p:tagLst xmlns:p="http://schemas.openxmlformats.org/presentationml/2006/main">
+  <p:tag name="KSO_WM_UNIT_TABLE_BEAUTIFY" val="smartTable{5f380890-b3d8-4456-9dbd-c5c8bb222d6f}"/>
+</p:tagLst>
 </file>
 
 <file path=ppt/theme/theme1.xml><?xml version="1.0" encoding="utf-8"?>

</xml_diff>